<commit_message>
Tweak to pptx templates
</commit_message>
<xml_diff>
--- a/_resources/templates/pptx/classy.pptx
+++ b/_resources/templates/pptx/classy.pptx
@@ -214,7 +214,7 @@
           <a:p>
             <a:fld id="{0F9C1CCF-B725-44A7-AA57-5E433BD85C9F}" type="datetimeFigureOut">
               <a:rPr lang="en-US" smtClean="0"/>
-              <a:t>3/8/21</a:t>
+              <a:t>1/31/22</a:t>
             </a:fld>
             <a:endParaRPr lang="en-US"/>
           </a:p>
@@ -734,7 +734,7 @@
           <a:p>
             <a:fld id="{241EB5C9-1307-BA42-ABA2-0BC069CD8E7F}" type="datetimeFigureOut">
               <a:rPr lang="en-US" smtClean="0"/>
-              <a:t>3/8/21</a:t>
+              <a:t>1/31/22</a:t>
             </a:fld>
             <a:endParaRPr lang="en-US"/>
           </a:p>
@@ -958,7 +958,7 @@
           <a:p>
             <a:fld id="{241EB5C9-1307-BA42-ABA2-0BC069CD8E7F}" type="datetimeFigureOut">
               <a:rPr lang="en-US" smtClean="0"/>
-              <a:t>3/8/21</a:t>
+              <a:t>1/31/22</a:t>
             </a:fld>
             <a:endParaRPr lang="en-US"/>
           </a:p>
@@ -1223,7 +1223,7 @@
           <a:p>
             <a:fld id="{241EB5C9-1307-BA42-ABA2-0BC069CD8E7F}" type="datetimeFigureOut">
               <a:rPr lang="en-US" smtClean="0"/>
-              <a:t>3/8/21</a:t>
+              <a:t>1/31/22</a:t>
             </a:fld>
             <a:endParaRPr lang="en-US"/>
           </a:p>
@@ -1516,7 +1516,7 @@
           <a:p>
             <a:fld id="{241EB5C9-1307-BA42-ABA2-0BC069CD8E7F}" type="datetimeFigureOut">
               <a:rPr lang="en-US" smtClean="0"/>
-              <a:t>3/8/21</a:t>
+              <a:t>1/31/22</a:t>
             </a:fld>
             <a:endParaRPr lang="en-US"/>
           </a:p>
@@ -1790,7 +1790,7 @@
           <a:p>
             <a:fld id="{241EB5C9-1307-BA42-ABA2-0BC069CD8E7F}" type="datetimeFigureOut">
               <a:rPr lang="en-US" smtClean="0"/>
-              <a:t>3/8/21</a:t>
+              <a:t>1/31/22</a:t>
             </a:fld>
             <a:endParaRPr lang="en-US"/>
           </a:p>
@@ -1966,7 +1966,7 @@
           <a:p>
             <a:fld id="{241EB5C9-1307-BA42-ABA2-0BC069CD8E7F}" type="datetimeFigureOut">
               <a:rPr lang="en-US" smtClean="0"/>
-              <a:t>3/8/21</a:t>
+              <a:t>1/31/22</a:t>
             </a:fld>
             <a:endParaRPr lang="en-US"/>
           </a:p>
@@ -2350,7 +2350,7 @@
           <a:p>
             <a:fld id="{241EB5C9-1307-BA42-ABA2-0BC069CD8E7F}" type="datetimeFigureOut">
               <a:rPr lang="en-US" smtClean="0"/>
-              <a:t>3/8/21</a:t>
+              <a:t>1/31/22</a:t>
             </a:fld>
             <a:endParaRPr lang="en-US"/>
           </a:p>
@@ -2868,7 +2868,7 @@
           <a:p>
             <a:fld id="{241EB5C9-1307-BA42-ABA2-0BC069CD8E7F}" type="datetimeFigureOut">
               <a:rPr lang="en-US" smtClean="0"/>
-              <a:t>3/8/21</a:t>
+              <a:t>1/31/22</a:t>
             </a:fld>
             <a:endParaRPr lang="en-US"/>
           </a:p>
@@ -2997,7 +2997,7 @@
             <a:lvl1pPr>
               <a:defRPr>
                 <a:solidFill>
-                  <a:srgbClr val="233A5B"/>
+                  <a:srgbClr val="FBD01E"/>
                 </a:solidFill>
               </a:defRPr>
             </a:lvl1pPr>
@@ -3034,7 +3034,7 @@
           <a:p>
             <a:fld id="{241EB5C9-1307-BA42-ABA2-0BC069CD8E7F}" type="datetimeFigureOut">
               <a:rPr lang="en-US" smtClean="0"/>
-              <a:t>3/8/21</a:t>
+              <a:t>1/31/22</a:t>
             </a:fld>
             <a:endParaRPr lang="en-US"/>
           </a:p>
@@ -3155,7 +3155,7 @@
           <a:p>
             <a:fld id="{241EB5C9-1307-BA42-ABA2-0BC069CD8E7F}" type="datetimeFigureOut">
               <a:rPr lang="en-US" smtClean="0"/>
-              <a:t>3/8/21</a:t>
+              <a:t>1/31/22</a:t>
             </a:fld>
             <a:endParaRPr lang="en-US"/>
           </a:p>
@@ -3286,7 +3286,7 @@
             <a:lvl1pPr>
               <a:defRPr sz="2800">
                 <a:solidFill>
-                  <a:srgbClr val="233A5B"/>
+                  <a:srgbClr val="FBD01E"/>
                 </a:solidFill>
               </a:defRPr>
             </a:lvl1pPr>
@@ -3442,7 +3442,7 @@
               <a:buNone/>
               <a:defRPr sz="1400">
                 <a:solidFill>
-                  <a:srgbClr val="233A5B"/>
+                  <a:srgbClr val="F4F7FC"/>
                 </a:solidFill>
               </a:defRPr>
             </a:lvl1pPr>
@@ -3511,7 +3511,7 @@
           <a:p>
             <a:fld id="{241EB5C9-1307-BA42-ABA2-0BC069CD8E7F}" type="datetimeFigureOut">
               <a:rPr lang="en-US" smtClean="0"/>
-              <a:t>3/8/21</a:t>
+              <a:t>1/31/22</a:t>
             </a:fld>
             <a:endParaRPr lang="en-US"/>
           </a:p>
@@ -3640,7 +3640,7 @@
             <a:lvl1pPr>
               <a:defRPr sz="1800">
                 <a:solidFill>
-                  <a:srgbClr val="233A5B"/>
+                  <a:srgbClr val="FBD01E"/>
                 </a:solidFill>
               </a:defRPr>
             </a:lvl1pPr>
@@ -3754,7 +3754,7 @@
               <a:buNone/>
               <a:defRPr sz="900">
                 <a:solidFill>
-                  <a:srgbClr val="233A5B"/>
+                  <a:srgbClr val="F4F7FC"/>
                 </a:solidFill>
               </a:defRPr>
             </a:lvl1pPr>
@@ -3823,7 +3823,7 @@
           <a:p>
             <a:fld id="{241EB5C9-1307-BA42-ABA2-0BC069CD8E7F}" type="datetimeFigureOut">
               <a:rPr lang="en-US" smtClean="0"/>
-              <a:t>3/8/21</a:t>
+              <a:t>1/31/22</a:t>
             </a:fld>
             <a:endParaRPr lang="en-US"/>
           </a:p>
@@ -4038,7 +4038,7 @@
           <a:p>
             <a:fld id="{241EB5C9-1307-BA42-ABA2-0BC069CD8E7F}" type="datetimeFigureOut">
               <a:rPr lang="en-US" smtClean="0"/>
-              <a:t>3/8/21</a:t>
+              <a:t>1/31/22</a:t>
             </a:fld>
             <a:endParaRPr lang="en-US"/>
           </a:p>

</xml_diff>